<commit_message>
Updated readme + more icons
</commit_message>
<xml_diff>
--- a/graphics.pptx
+++ b/graphics.pptx
@@ -104,6 +104,11 @@
       </a:defRPr>
     </a:lvl9pPr>
   </p:defaultTextStyle>
+  <p:extLst>
+    <p:ext uri="{EFAFB233-063F-42B5-8137-9DF3F51BA10A}">
+      <p15:sldGuideLst xmlns:p15="http://schemas.microsoft.com/office/powerpoint/2012/main"/>
+    </p:ext>
+  </p:extLst>
 </p:presentation>
 </file>
 
@@ -254,7 +259,7 @@
           <a:p>
             <a:fld id="{DB06B6BD-112E-43A2-A1C1-0DBA63C63E39}" type="datetimeFigureOut">
               <a:rPr lang="en-US" smtClean="0"/>
-              <a:t>3/12/2023</a:t>
+              <a:t>3/13/2023</a:t>
             </a:fld>
             <a:endParaRPr lang="en-US"/>
           </a:p>
@@ -452,7 +457,7 @@
           <a:p>
             <a:fld id="{DB06B6BD-112E-43A2-A1C1-0DBA63C63E39}" type="datetimeFigureOut">
               <a:rPr lang="en-US" smtClean="0"/>
-              <a:t>3/12/2023</a:t>
+              <a:t>3/13/2023</a:t>
             </a:fld>
             <a:endParaRPr lang="en-US"/>
           </a:p>
@@ -660,7 +665,7 @@
           <a:p>
             <a:fld id="{DB06B6BD-112E-43A2-A1C1-0DBA63C63E39}" type="datetimeFigureOut">
               <a:rPr lang="en-US" smtClean="0"/>
-              <a:t>3/12/2023</a:t>
+              <a:t>3/13/2023</a:t>
             </a:fld>
             <a:endParaRPr lang="en-US"/>
           </a:p>
@@ -858,7 +863,7 @@
           <a:p>
             <a:fld id="{DB06B6BD-112E-43A2-A1C1-0DBA63C63E39}" type="datetimeFigureOut">
               <a:rPr lang="en-US" smtClean="0"/>
-              <a:t>3/12/2023</a:t>
+              <a:t>3/13/2023</a:t>
             </a:fld>
             <a:endParaRPr lang="en-US"/>
           </a:p>
@@ -1133,7 +1138,7 @@
           <a:p>
             <a:fld id="{DB06B6BD-112E-43A2-A1C1-0DBA63C63E39}" type="datetimeFigureOut">
               <a:rPr lang="en-US" smtClean="0"/>
-              <a:t>3/12/2023</a:t>
+              <a:t>3/13/2023</a:t>
             </a:fld>
             <a:endParaRPr lang="en-US"/>
           </a:p>
@@ -1398,7 +1403,7 @@
           <a:p>
             <a:fld id="{DB06B6BD-112E-43A2-A1C1-0DBA63C63E39}" type="datetimeFigureOut">
               <a:rPr lang="en-US" smtClean="0"/>
-              <a:t>3/12/2023</a:t>
+              <a:t>3/13/2023</a:t>
             </a:fld>
             <a:endParaRPr lang="en-US"/>
           </a:p>
@@ -1810,7 +1815,7 @@
           <a:p>
             <a:fld id="{DB06B6BD-112E-43A2-A1C1-0DBA63C63E39}" type="datetimeFigureOut">
               <a:rPr lang="en-US" smtClean="0"/>
-              <a:t>3/12/2023</a:t>
+              <a:t>3/13/2023</a:t>
             </a:fld>
             <a:endParaRPr lang="en-US"/>
           </a:p>
@@ -1951,7 +1956,7 @@
           <a:p>
             <a:fld id="{DB06B6BD-112E-43A2-A1C1-0DBA63C63E39}" type="datetimeFigureOut">
               <a:rPr lang="en-US" smtClean="0"/>
-              <a:t>3/12/2023</a:t>
+              <a:t>3/13/2023</a:t>
             </a:fld>
             <a:endParaRPr lang="en-US"/>
           </a:p>
@@ -2064,7 +2069,7 @@
           <a:p>
             <a:fld id="{DB06B6BD-112E-43A2-A1C1-0DBA63C63E39}" type="datetimeFigureOut">
               <a:rPr lang="en-US" smtClean="0"/>
-              <a:t>3/12/2023</a:t>
+              <a:t>3/13/2023</a:t>
             </a:fld>
             <a:endParaRPr lang="en-US"/>
           </a:p>
@@ -2375,7 +2380,7 @@
           <a:p>
             <a:fld id="{DB06B6BD-112E-43A2-A1C1-0DBA63C63E39}" type="datetimeFigureOut">
               <a:rPr lang="en-US" smtClean="0"/>
-              <a:t>3/12/2023</a:t>
+              <a:t>3/13/2023</a:t>
             </a:fld>
             <a:endParaRPr lang="en-US"/>
           </a:p>
@@ -2663,7 +2668,7 @@
           <a:p>
             <a:fld id="{DB06B6BD-112E-43A2-A1C1-0DBA63C63E39}" type="datetimeFigureOut">
               <a:rPr lang="en-US" smtClean="0"/>
-              <a:t>3/12/2023</a:t>
+              <a:t>3/13/2023</a:t>
             </a:fld>
             <a:endParaRPr lang="en-US"/>
           </a:p>
@@ -2904,7 +2909,7 @@
           <a:p>
             <a:fld id="{DB06B6BD-112E-43A2-A1C1-0DBA63C63E39}" type="datetimeFigureOut">
               <a:rPr lang="en-US" smtClean="0"/>
-              <a:t>3/12/2023</a:t>
+              <a:t>3/13/2023</a:t>
             </a:fld>
             <a:endParaRPr lang="en-US"/>
           </a:p>
@@ -3335,7 +3340,7 @@
         </p:nvSpPr>
         <p:spPr>
           <a:xfrm>
-            <a:off x="8653300" y="3376414"/>
+            <a:off x="3129931" y="5995224"/>
             <a:ext cx="666750" cy="504834"/>
           </a:xfrm>
           <a:custGeom>
@@ -3506,7 +3511,7 @@
         </p:blipFill>
         <p:spPr>
           <a:xfrm>
-            <a:off x="7712966" y="376526"/>
+            <a:off x="4835864" y="5712588"/>
             <a:ext cx="914400" cy="914400"/>
           </a:xfrm>
           <a:prstGeom prst="rect">
@@ -3623,7 +3628,7 @@
         </p:blipFill>
         <p:spPr>
           <a:xfrm rot="375875">
-            <a:off x="8510126" y="2701212"/>
+            <a:off x="2986757" y="5320022"/>
             <a:ext cx="732355" cy="732355"/>
           </a:xfrm>
           <a:prstGeom prst="rect">
@@ -3662,7 +3667,7 @@
         </p:blipFill>
         <p:spPr>
           <a:xfrm>
-            <a:off x="7296000" y="2396944"/>
+            <a:off x="6280879" y="3009603"/>
             <a:ext cx="914400" cy="914400"/>
           </a:xfrm>
           <a:prstGeom prst="rect">
@@ -3740,7 +3745,7 @@
         </p:blipFill>
         <p:spPr>
           <a:xfrm>
-            <a:off x="4220066" y="4918256"/>
+            <a:off x="4041329" y="4771800"/>
             <a:ext cx="914400" cy="914400"/>
           </a:xfrm>
           <a:prstGeom prst="rect">
@@ -3779,7 +3784,7 @@
         </p:blipFill>
         <p:spPr>
           <a:xfrm>
-            <a:off x="6664537" y="4031536"/>
+            <a:off x="6624389" y="4361354"/>
             <a:ext cx="914400" cy="914400"/>
           </a:xfrm>
           <a:prstGeom prst="rect">
@@ -3818,7 +3823,7 @@
         </p:blipFill>
         <p:spPr>
           <a:xfrm>
-            <a:off x="9138198" y="5256891"/>
+            <a:off x="4219247" y="2204258"/>
             <a:ext cx="914400" cy="914400"/>
           </a:xfrm>
           <a:prstGeom prst="rect">
@@ -3857,7 +3862,7 @@
         </p:blipFill>
         <p:spPr>
           <a:xfrm>
-            <a:off x="6039402" y="5256891"/>
+            <a:off x="5984401" y="5388914"/>
             <a:ext cx="914400" cy="914400"/>
           </a:xfrm>
           <a:prstGeom prst="rect">
@@ -3935,7 +3940,7 @@
         </p:blipFill>
         <p:spPr>
           <a:xfrm>
-            <a:off x="7210200" y="5229000"/>
+            <a:off x="7191997" y="5637508"/>
             <a:ext cx="914400" cy="914400"/>
           </a:xfrm>
           <a:prstGeom prst="rect">
@@ -4169,7 +4174,7 @@
         </p:blipFill>
         <p:spPr>
           <a:xfrm>
-            <a:off x="5811065" y="3028516"/>
+            <a:off x="5446976" y="3285926"/>
             <a:ext cx="914400" cy="914400"/>
           </a:xfrm>
           <a:prstGeom prst="rect">
@@ -4230,7 +4235,7 @@
         </p:nvSpPr>
         <p:spPr>
           <a:xfrm>
-            <a:off x="8681875" y="3576439"/>
+            <a:off x="3158506" y="6195249"/>
             <a:ext cx="714375" cy="333375"/>
           </a:xfrm>
           <a:custGeom>
@@ -4373,7 +4378,7 @@
         </p:blipFill>
         <p:spPr>
           <a:xfrm>
-            <a:off x="7510855" y="3924006"/>
+            <a:off x="7593615" y="4313654"/>
             <a:ext cx="338544" cy="338544"/>
           </a:xfrm>
           <a:prstGeom prst="rect">
@@ -5535,6 +5540,162 @@
           </p:txBody>
         </p:sp>
       </p:grpSp>
+      <p:pic>
+        <p:nvPicPr>
+          <p:cNvPr id="3" name="Graphic 2" descr="Play with solid fill">
+            <a:extLst>
+              <a:ext uri="{FF2B5EF4-FFF2-40B4-BE49-F238E27FC236}">
+                <a16:creationId xmlns:a16="http://schemas.microsoft.com/office/drawing/2014/main" id="{D0B54823-E08B-DEDB-99B5-848ED4B8993D}"/>
+              </a:ext>
+            </a:extLst>
+          </p:cNvPr>
+          <p:cNvPicPr>
+            <a:picLocks noChangeAspect="1"/>
+          </p:cNvPicPr>
+          <p:nvPr/>
+        </p:nvPicPr>
+        <p:blipFill>
+          <a:blip r:embed="rId47">
+            <a:extLst>
+              <a:ext uri="{28A0092B-C50C-407E-A947-70E740481C1C}">
+                <a14:useLocalDpi xmlns:a14="http://schemas.microsoft.com/office/drawing/2010/main" val="0"/>
+              </a:ext>
+              <a:ext uri="{96DAC541-7B7A-43D3-8B79-37D633B846F1}">
+                <asvg:svgBlip xmlns:asvg="http://schemas.microsoft.com/office/drawing/2016/SVG/main" r:embed="rId48"/>
+              </a:ext>
+            </a:extLst>
+          </a:blip>
+          <a:stretch>
+            <a:fillRect/>
+          </a:stretch>
+        </p:blipFill>
+        <p:spPr>
+          <a:xfrm>
+            <a:off x="4629506" y="312549"/>
+            <a:ext cx="914400" cy="914400"/>
+          </a:xfrm>
+          <a:prstGeom prst="rect">
+            <a:avLst/>
+          </a:prstGeom>
+        </p:spPr>
+      </p:pic>
+      <p:pic>
+        <p:nvPicPr>
+          <p:cNvPr id="6" name="Graphic 5" descr="Film strip with solid fill">
+            <a:extLst>
+              <a:ext uri="{FF2B5EF4-FFF2-40B4-BE49-F238E27FC236}">
+                <a16:creationId xmlns:a16="http://schemas.microsoft.com/office/drawing/2014/main" id="{B17697B7-A213-B361-5F93-6D0758724621}"/>
+              </a:ext>
+            </a:extLst>
+          </p:cNvPr>
+          <p:cNvPicPr>
+            <a:picLocks noChangeAspect="1"/>
+          </p:cNvPicPr>
+          <p:nvPr/>
+        </p:nvPicPr>
+        <p:blipFill>
+          <a:blip r:embed="rId49">
+            <a:extLst>
+              <a:ext uri="{28A0092B-C50C-407E-A947-70E740481C1C}">
+                <a14:useLocalDpi xmlns:a14="http://schemas.microsoft.com/office/drawing/2010/main" val="0"/>
+              </a:ext>
+              <a:ext uri="{96DAC541-7B7A-43D3-8B79-37D633B846F1}">
+                <asvg:svgBlip xmlns:asvg="http://schemas.microsoft.com/office/drawing/2016/SVG/main" r:embed="rId50"/>
+              </a:ext>
+            </a:extLst>
+          </a:blip>
+          <a:stretch>
+            <a:fillRect/>
+          </a:stretch>
+        </p:blipFill>
+        <p:spPr>
+          <a:xfrm>
+            <a:off x="6679215" y="358056"/>
+            <a:ext cx="914400" cy="914400"/>
+          </a:xfrm>
+          <a:prstGeom prst="rect">
+            <a:avLst/>
+          </a:prstGeom>
+        </p:spPr>
+      </p:pic>
+      <p:pic>
+        <p:nvPicPr>
+          <p:cNvPr id="10" name="Graphic 9" descr="Video camera with solid fill">
+            <a:extLst>
+              <a:ext uri="{FF2B5EF4-FFF2-40B4-BE49-F238E27FC236}">
+                <a16:creationId xmlns:a16="http://schemas.microsoft.com/office/drawing/2014/main" id="{D0FA2693-FEAB-9309-4586-0821D5B5FB93}"/>
+              </a:ext>
+            </a:extLst>
+          </p:cNvPr>
+          <p:cNvPicPr>
+            <a:picLocks noChangeAspect="1"/>
+          </p:cNvPicPr>
+          <p:nvPr/>
+        </p:nvPicPr>
+        <p:blipFill>
+          <a:blip r:embed="rId51">
+            <a:extLst>
+              <a:ext uri="{28A0092B-C50C-407E-A947-70E740481C1C}">
+                <a14:useLocalDpi xmlns:a14="http://schemas.microsoft.com/office/drawing/2010/main" val="0"/>
+              </a:ext>
+              <a:ext uri="{96DAC541-7B7A-43D3-8B79-37D633B846F1}">
+                <asvg:svgBlip xmlns:asvg="http://schemas.microsoft.com/office/drawing/2016/SVG/main" r:embed="rId52"/>
+              </a:ext>
+            </a:extLst>
+          </a:blip>
+          <a:stretch>
+            <a:fillRect/>
+          </a:stretch>
+        </p:blipFill>
+        <p:spPr>
+          <a:xfrm>
+            <a:off x="7672455" y="324639"/>
+            <a:ext cx="914400" cy="914400"/>
+          </a:xfrm>
+          <a:prstGeom prst="rect">
+            <a:avLst/>
+          </a:prstGeom>
+        </p:spPr>
+      </p:pic>
+      <p:pic>
+        <p:nvPicPr>
+          <p:cNvPr id="14" name="Graphic 13" descr="Clapper board with solid fill">
+            <a:extLst>
+              <a:ext uri="{FF2B5EF4-FFF2-40B4-BE49-F238E27FC236}">
+                <a16:creationId xmlns:a16="http://schemas.microsoft.com/office/drawing/2014/main" id="{A09CC074-CCD2-BEDF-A5F5-89874311E9EE}"/>
+              </a:ext>
+            </a:extLst>
+          </p:cNvPr>
+          <p:cNvPicPr>
+            <a:picLocks noChangeAspect="1"/>
+          </p:cNvPicPr>
+          <p:nvPr/>
+        </p:nvPicPr>
+        <p:blipFill>
+          <a:blip r:embed="rId53">
+            <a:extLst>
+              <a:ext uri="{28A0092B-C50C-407E-A947-70E740481C1C}">
+                <a14:useLocalDpi xmlns:a14="http://schemas.microsoft.com/office/drawing/2010/main" val="0"/>
+              </a:ext>
+              <a:ext uri="{96DAC541-7B7A-43D3-8B79-37D633B846F1}">
+                <asvg:svgBlip xmlns:asvg="http://schemas.microsoft.com/office/drawing/2016/SVG/main" r:embed="rId54"/>
+              </a:ext>
+            </a:extLst>
+          </a:blip>
+          <a:stretch>
+            <a:fillRect/>
+          </a:stretch>
+        </p:blipFill>
+        <p:spPr>
+          <a:xfrm>
+            <a:off x="5699318" y="366454"/>
+            <a:ext cx="914400" cy="914400"/>
+          </a:xfrm>
+          <a:prstGeom prst="rect">
+            <a:avLst/>
+          </a:prstGeom>
+        </p:spPr>
+      </p:pic>
     </p:spTree>
     <p:extLst>
       <p:ext uri="{BB962C8B-B14F-4D97-AF65-F5344CB8AC3E}">

</xml_diff>

<commit_message>
Halfway down adding more file types to browser
</commit_message>
<xml_diff>
--- a/graphics.pptx
+++ b/graphics.pptx
@@ -259,7 +259,7 @@
           <a:p>
             <a:fld id="{DB06B6BD-112E-43A2-A1C1-0DBA63C63E39}" type="datetimeFigureOut">
               <a:rPr lang="en-US" smtClean="0"/>
-              <a:t>3/13/2023</a:t>
+              <a:t>11/19/2023</a:t>
             </a:fld>
             <a:endParaRPr lang="en-US"/>
           </a:p>
@@ -457,7 +457,7 @@
           <a:p>
             <a:fld id="{DB06B6BD-112E-43A2-A1C1-0DBA63C63E39}" type="datetimeFigureOut">
               <a:rPr lang="en-US" smtClean="0"/>
-              <a:t>3/13/2023</a:t>
+              <a:t>11/19/2023</a:t>
             </a:fld>
             <a:endParaRPr lang="en-US"/>
           </a:p>
@@ -665,7 +665,7 @@
           <a:p>
             <a:fld id="{DB06B6BD-112E-43A2-A1C1-0DBA63C63E39}" type="datetimeFigureOut">
               <a:rPr lang="en-US" smtClean="0"/>
-              <a:t>3/13/2023</a:t>
+              <a:t>11/19/2023</a:t>
             </a:fld>
             <a:endParaRPr lang="en-US"/>
           </a:p>
@@ -863,7 +863,7 @@
           <a:p>
             <a:fld id="{DB06B6BD-112E-43A2-A1C1-0DBA63C63E39}" type="datetimeFigureOut">
               <a:rPr lang="en-US" smtClean="0"/>
-              <a:t>3/13/2023</a:t>
+              <a:t>11/19/2023</a:t>
             </a:fld>
             <a:endParaRPr lang="en-US"/>
           </a:p>
@@ -1138,7 +1138,7 @@
           <a:p>
             <a:fld id="{DB06B6BD-112E-43A2-A1C1-0DBA63C63E39}" type="datetimeFigureOut">
               <a:rPr lang="en-US" smtClean="0"/>
-              <a:t>3/13/2023</a:t>
+              <a:t>11/19/2023</a:t>
             </a:fld>
             <a:endParaRPr lang="en-US"/>
           </a:p>
@@ -1403,7 +1403,7 @@
           <a:p>
             <a:fld id="{DB06B6BD-112E-43A2-A1C1-0DBA63C63E39}" type="datetimeFigureOut">
               <a:rPr lang="en-US" smtClean="0"/>
-              <a:t>3/13/2023</a:t>
+              <a:t>11/19/2023</a:t>
             </a:fld>
             <a:endParaRPr lang="en-US"/>
           </a:p>
@@ -1815,7 +1815,7 @@
           <a:p>
             <a:fld id="{DB06B6BD-112E-43A2-A1C1-0DBA63C63E39}" type="datetimeFigureOut">
               <a:rPr lang="en-US" smtClean="0"/>
-              <a:t>3/13/2023</a:t>
+              <a:t>11/19/2023</a:t>
             </a:fld>
             <a:endParaRPr lang="en-US"/>
           </a:p>
@@ -1956,7 +1956,7 @@
           <a:p>
             <a:fld id="{DB06B6BD-112E-43A2-A1C1-0DBA63C63E39}" type="datetimeFigureOut">
               <a:rPr lang="en-US" smtClean="0"/>
-              <a:t>3/13/2023</a:t>
+              <a:t>11/19/2023</a:t>
             </a:fld>
             <a:endParaRPr lang="en-US"/>
           </a:p>
@@ -2069,7 +2069,7 @@
           <a:p>
             <a:fld id="{DB06B6BD-112E-43A2-A1C1-0DBA63C63E39}" type="datetimeFigureOut">
               <a:rPr lang="en-US" smtClean="0"/>
-              <a:t>3/13/2023</a:t>
+              <a:t>11/19/2023</a:t>
             </a:fld>
             <a:endParaRPr lang="en-US"/>
           </a:p>
@@ -2380,7 +2380,7 @@
           <a:p>
             <a:fld id="{DB06B6BD-112E-43A2-A1C1-0DBA63C63E39}" type="datetimeFigureOut">
               <a:rPr lang="en-US" smtClean="0"/>
-              <a:t>3/13/2023</a:t>
+              <a:t>11/19/2023</a:t>
             </a:fld>
             <a:endParaRPr lang="en-US"/>
           </a:p>
@@ -2668,7 +2668,7 @@
           <a:p>
             <a:fld id="{DB06B6BD-112E-43A2-A1C1-0DBA63C63E39}" type="datetimeFigureOut">
               <a:rPr lang="en-US" smtClean="0"/>
-              <a:t>3/13/2023</a:t>
+              <a:t>11/19/2023</a:t>
             </a:fld>
             <a:endParaRPr lang="en-US"/>
           </a:p>
@@ -2909,7 +2909,7 @@
           <a:p>
             <a:fld id="{DB06B6BD-112E-43A2-A1C1-0DBA63C63E39}" type="datetimeFigureOut">
               <a:rPr lang="en-US" smtClean="0"/>
-              <a:t>3/13/2023</a:t>
+              <a:t>11/19/2023</a:t>
             </a:fld>
             <a:endParaRPr lang="en-US"/>
           </a:p>
@@ -5696,6 +5696,123 @@
           </a:prstGeom>
         </p:spPr>
       </p:pic>
+      <p:pic>
+        <p:nvPicPr>
+          <p:cNvPr id="4" name="Graphic 3" descr="Squiggle with solid fill">
+            <a:extLst>
+              <a:ext uri="{FF2B5EF4-FFF2-40B4-BE49-F238E27FC236}">
+                <a16:creationId xmlns:a16="http://schemas.microsoft.com/office/drawing/2014/main" id="{52624C03-F839-B9FF-E9B1-466332CF4758}"/>
+              </a:ext>
+            </a:extLst>
+          </p:cNvPr>
+          <p:cNvPicPr>
+            <a:picLocks noChangeAspect="1"/>
+          </p:cNvPicPr>
+          <p:nvPr/>
+        </p:nvPicPr>
+        <p:blipFill>
+          <a:blip r:embed="rId55">
+            <a:extLst>
+              <a:ext uri="{28A0092B-C50C-407E-A947-70E740481C1C}">
+                <a14:useLocalDpi xmlns:a14="http://schemas.microsoft.com/office/drawing/2010/main" val="0"/>
+              </a:ext>
+              <a:ext uri="{96DAC541-7B7A-43D3-8B79-37D633B846F1}">
+                <asvg:svgBlip xmlns:asvg="http://schemas.microsoft.com/office/drawing/2016/SVG/main" r:embed="rId56"/>
+              </a:ext>
+            </a:extLst>
+          </a:blip>
+          <a:stretch>
+            <a:fillRect/>
+          </a:stretch>
+        </p:blipFill>
+        <p:spPr>
+          <a:xfrm>
+            <a:off x="10164607" y="5333241"/>
+            <a:ext cx="914400" cy="914400"/>
+          </a:xfrm>
+          <a:prstGeom prst="rect">
+            <a:avLst/>
+          </a:prstGeom>
+        </p:spPr>
+      </p:pic>
+      <p:pic>
+        <p:nvPicPr>
+          <p:cNvPr id="12" name="Graphic 11" descr="Miscellaneous with solid fill">
+            <a:extLst>
+              <a:ext uri="{FF2B5EF4-FFF2-40B4-BE49-F238E27FC236}">
+                <a16:creationId xmlns:a16="http://schemas.microsoft.com/office/drawing/2014/main" id="{C6A470F9-3A27-132B-916D-B3A23D6F8228}"/>
+              </a:ext>
+            </a:extLst>
+          </p:cNvPr>
+          <p:cNvPicPr>
+            <a:picLocks noChangeAspect="1"/>
+          </p:cNvPicPr>
+          <p:nvPr/>
+        </p:nvPicPr>
+        <p:blipFill>
+          <a:blip r:embed="rId57">
+            <a:extLst>
+              <a:ext uri="{28A0092B-C50C-407E-A947-70E740481C1C}">
+                <a14:useLocalDpi xmlns:a14="http://schemas.microsoft.com/office/drawing/2010/main" val="0"/>
+              </a:ext>
+              <a:ext uri="{96DAC541-7B7A-43D3-8B79-37D633B846F1}">
+                <asvg:svgBlip xmlns:asvg="http://schemas.microsoft.com/office/drawing/2016/SVG/main" r:embed="rId58"/>
+              </a:ext>
+            </a:extLst>
+          </a:blip>
+          <a:stretch>
+            <a:fillRect/>
+          </a:stretch>
+        </p:blipFill>
+        <p:spPr>
+          <a:xfrm>
+            <a:off x="9059263" y="5538024"/>
+            <a:ext cx="914400" cy="914400"/>
+          </a:xfrm>
+          <a:prstGeom prst="rect">
+            <a:avLst/>
+          </a:prstGeom>
+        </p:spPr>
+      </p:pic>
+      <p:pic>
+        <p:nvPicPr>
+          <p:cNvPr id="22" name="Graphic 21" descr="Paper with solid fill">
+            <a:extLst>
+              <a:ext uri="{FF2B5EF4-FFF2-40B4-BE49-F238E27FC236}">
+                <a16:creationId xmlns:a16="http://schemas.microsoft.com/office/drawing/2014/main" id="{692D3D30-B9E5-903D-B4E1-D693C927FD30}"/>
+              </a:ext>
+            </a:extLst>
+          </p:cNvPr>
+          <p:cNvPicPr>
+            <a:picLocks noChangeAspect="1"/>
+          </p:cNvPicPr>
+          <p:nvPr/>
+        </p:nvPicPr>
+        <p:blipFill>
+          <a:blip r:embed="rId59">
+            <a:extLst>
+              <a:ext uri="{28A0092B-C50C-407E-A947-70E740481C1C}">
+                <a14:useLocalDpi xmlns:a14="http://schemas.microsoft.com/office/drawing/2010/main" val="0"/>
+              </a:ext>
+              <a:ext uri="{96DAC541-7B7A-43D3-8B79-37D633B846F1}">
+                <asvg:svgBlip xmlns:asvg="http://schemas.microsoft.com/office/drawing/2016/SVG/main" r:embed="rId60"/>
+              </a:ext>
+            </a:extLst>
+          </a:blip>
+          <a:stretch>
+            <a:fillRect/>
+          </a:stretch>
+        </p:blipFill>
+        <p:spPr>
+          <a:xfrm>
+            <a:off x="11137662" y="5388914"/>
+            <a:ext cx="914400" cy="914400"/>
+          </a:xfrm>
+          <a:prstGeom prst="rect">
+            <a:avLst/>
+          </a:prstGeom>
+        </p:spPr>
+      </p:pic>
     </p:spTree>
     <p:extLst>
       <p:ext uri="{BB962C8B-B14F-4D97-AF65-F5344CB8AC3E}">

</xml_diff>